<commit_message>
Add xml:space="preserve" at beginning and end of placeholder
</commit_message>
<xml_diff>
--- a/examples/expected-raw-xml-example.pptx
+++ b/examples/expected-raw-xml-example.pptx
@@ -8,7 +8,7 @@
     <p:sldId id="256" r:id="rId3"/>
   </p:sldIdLst>
   <p:sldSz cx="10080625" cy="7559675"/>
-  <p:notesSz cx="7559675" cy="10691812"/>
+  <p:notesSz cx="7772400" cy="10058400"/>
 </p:presentation>
 </file>
 
@@ -64,7 +64,7 @@
         <p:spPr>
           <a:xfrm>
             <a:off x="504000" y="301320"/>
-            <a:ext cx="9071280" cy="1262160"/>
+            <a:ext cx="9070920" cy="1261800"/>
           </a:xfrm>
           <a:prstGeom prst="rect">
             <a:avLst/>
@@ -74,15 +74,7 @@
           <a:bodyPr lIns="0" rIns="0" tIns="0" bIns="0" anchor="ctr"/>
           <a:p>
             <a:pPr algn="ctr"/>
-            <a:endParaRPr b="0" lang="fr-FR" sz="4400" spc="-1" strike="noStrike">
-              <a:solidFill>
-                <a:srgbClr val="000000"/>
-              </a:solidFill>
-              <a:uFill>
-                <a:solidFill>
-                  <a:srgbClr val="ffffff"/>
-                </a:solidFill>
-              </a:uFill>
+            <a:endParaRPr b="0" lang="en-US" sz="4400" spc="-1" strike="noStrike">
               <a:latin typeface="Arial"/>
             </a:endParaRPr>
           </a:p>
@@ -101,24 +93,18 @@
         <p:spPr>
           <a:xfrm>
             <a:off x="504000" y="1768680"/>
-            <a:ext cx="9072000" cy="2090880"/>
-          </a:xfrm>
-          <a:prstGeom prst="rect">
-            <a:avLst/>
-          </a:prstGeom>
-        </p:spPr>
-        <p:txBody>
-          <a:bodyPr lIns="0" rIns="0" tIns="0" bIns="0"/>
-          <a:p>
-            <a:endParaRPr b="0" lang="fr-FR" sz="3200" spc="-1" strike="noStrike">
-              <a:solidFill>
-                <a:srgbClr val="000000"/>
-              </a:solidFill>
-              <a:uFill>
-                <a:solidFill>
-                  <a:srgbClr val="ffffff"/>
-                </a:solidFill>
-              </a:uFill>
+            <a:ext cx="9071640" cy="2090880"/>
+          </a:xfrm>
+          <a:prstGeom prst="rect">
+            <a:avLst/>
+          </a:prstGeom>
+        </p:spPr>
+        <p:txBody>
+          <a:bodyPr lIns="0" rIns="0" tIns="0" bIns="0">
+            <a:normAutofit/>
+          </a:bodyPr>
+          <a:p>
+            <a:endParaRPr b="0" lang="en-US" sz="3200" spc="-1" strike="noStrike">
               <a:latin typeface="Arial"/>
             </a:endParaRPr>
           </a:p>
@@ -137,24 +123,18 @@
         <p:spPr>
           <a:xfrm>
             <a:off x="504000" y="4058640"/>
-            <a:ext cx="9072000" cy="2090880"/>
-          </a:xfrm>
-          <a:prstGeom prst="rect">
-            <a:avLst/>
-          </a:prstGeom>
-        </p:spPr>
-        <p:txBody>
-          <a:bodyPr lIns="0" rIns="0" tIns="0" bIns="0"/>
-          <a:p>
-            <a:endParaRPr b="0" lang="fr-FR" sz="3200" spc="-1" strike="noStrike">
-              <a:solidFill>
-                <a:srgbClr val="000000"/>
-              </a:solidFill>
-              <a:uFill>
-                <a:solidFill>
-                  <a:srgbClr val="ffffff"/>
-                </a:solidFill>
-              </a:uFill>
+            <a:ext cx="9071640" cy="2090880"/>
+          </a:xfrm>
+          <a:prstGeom prst="rect">
+            <a:avLst/>
+          </a:prstGeom>
+        </p:spPr>
+        <p:txBody>
+          <a:bodyPr lIns="0" rIns="0" tIns="0" bIns="0">
+            <a:normAutofit/>
+          </a:bodyPr>
+          <a:p>
+            <a:endParaRPr b="0" lang="en-US" sz="3200" spc="-1" strike="noStrike">
               <a:latin typeface="Arial"/>
             </a:endParaRPr>
           </a:p>
@@ -195,7 +175,7 @@
         <p:spPr>
           <a:xfrm>
             <a:off x="504000" y="301320"/>
-            <a:ext cx="9071280" cy="1262160"/>
+            <a:ext cx="9070920" cy="1261800"/>
           </a:xfrm>
           <a:prstGeom prst="rect">
             <a:avLst/>
@@ -205,15 +185,7 @@
           <a:bodyPr lIns="0" rIns="0" tIns="0" bIns="0" anchor="ctr"/>
           <a:p>
             <a:pPr algn="ctr"/>
-            <a:endParaRPr b="0" lang="fr-FR" sz="4400" spc="-1" strike="noStrike">
-              <a:solidFill>
-                <a:srgbClr val="000000"/>
-              </a:solidFill>
-              <a:uFill>
-                <a:solidFill>
-                  <a:srgbClr val="ffffff"/>
-                </a:solidFill>
-              </a:uFill>
+            <a:endParaRPr b="0" lang="en-US" sz="4400" spc="-1" strike="noStrike">
               <a:latin typeface="Arial"/>
             </a:endParaRPr>
           </a:p>
@@ -239,17 +211,11 @@
           </a:prstGeom>
         </p:spPr>
         <p:txBody>
-          <a:bodyPr lIns="0" rIns="0" tIns="0" bIns="0"/>
-          <a:p>
-            <a:endParaRPr b="0" lang="fr-FR" sz="3200" spc="-1" strike="noStrike">
-              <a:solidFill>
-                <a:srgbClr val="000000"/>
-              </a:solidFill>
-              <a:uFill>
-                <a:solidFill>
-                  <a:srgbClr val="ffffff"/>
-                </a:solidFill>
-              </a:uFill>
+          <a:bodyPr lIns="0" rIns="0" tIns="0" bIns="0">
+            <a:normAutofit/>
+          </a:bodyPr>
+          <a:p>
+            <a:endParaRPr b="0" lang="en-US" sz="3200" spc="-1" strike="noStrike">
               <a:latin typeface="Arial"/>
             </a:endParaRPr>
           </a:p>
@@ -275,17 +241,11 @@
           </a:prstGeom>
         </p:spPr>
         <p:txBody>
-          <a:bodyPr lIns="0" rIns="0" tIns="0" bIns="0"/>
-          <a:p>
-            <a:endParaRPr b="0" lang="fr-FR" sz="3200" spc="-1" strike="noStrike">
-              <a:solidFill>
-                <a:srgbClr val="000000"/>
-              </a:solidFill>
-              <a:uFill>
-                <a:solidFill>
-                  <a:srgbClr val="ffffff"/>
-                </a:solidFill>
-              </a:uFill>
+          <a:bodyPr lIns="0" rIns="0" tIns="0" bIns="0">
+            <a:normAutofit/>
+          </a:bodyPr>
+          <a:p>
+            <a:endParaRPr b="0" lang="en-US" sz="3200" spc="-1" strike="noStrike">
               <a:latin typeface="Arial"/>
             </a:endParaRPr>
           </a:p>
@@ -311,17 +271,11 @@
           </a:prstGeom>
         </p:spPr>
         <p:txBody>
-          <a:bodyPr lIns="0" rIns="0" tIns="0" bIns="0"/>
-          <a:p>
-            <a:endParaRPr b="0" lang="fr-FR" sz="3200" spc="-1" strike="noStrike">
-              <a:solidFill>
-                <a:srgbClr val="000000"/>
-              </a:solidFill>
-              <a:uFill>
-                <a:solidFill>
-                  <a:srgbClr val="ffffff"/>
-                </a:solidFill>
-              </a:uFill>
+          <a:bodyPr lIns="0" rIns="0" tIns="0" bIns="0">
+            <a:normAutofit/>
+          </a:bodyPr>
+          <a:p>
+            <a:endParaRPr b="0" lang="en-US" sz="3200" spc="-1" strike="noStrike">
               <a:latin typeface="Arial"/>
             </a:endParaRPr>
           </a:p>
@@ -347,17 +301,11 @@
           </a:prstGeom>
         </p:spPr>
         <p:txBody>
-          <a:bodyPr lIns="0" rIns="0" tIns="0" bIns="0"/>
-          <a:p>
-            <a:endParaRPr b="0" lang="fr-FR" sz="3200" spc="-1" strike="noStrike">
-              <a:solidFill>
-                <a:srgbClr val="000000"/>
-              </a:solidFill>
-              <a:uFill>
-                <a:solidFill>
-                  <a:srgbClr val="ffffff"/>
-                </a:solidFill>
-              </a:uFill>
+          <a:bodyPr lIns="0" rIns="0" tIns="0" bIns="0">
+            <a:normAutofit/>
+          </a:bodyPr>
+          <a:p>
+            <a:endParaRPr b="0" lang="en-US" sz="3200" spc="-1" strike="noStrike">
               <a:latin typeface="Arial"/>
             </a:endParaRPr>
           </a:p>
@@ -398,7 +346,7 @@
         <p:spPr>
           <a:xfrm>
             <a:off x="504000" y="301320"/>
-            <a:ext cx="9071280" cy="1262160"/>
+            <a:ext cx="9070920" cy="1261800"/>
           </a:xfrm>
           <a:prstGeom prst="rect">
             <a:avLst/>
@@ -408,15 +356,7 @@
           <a:bodyPr lIns="0" rIns="0" tIns="0" bIns="0" anchor="ctr"/>
           <a:p>
             <a:pPr algn="ctr"/>
-            <a:endParaRPr b="0" lang="fr-FR" sz="4400" spc="-1" strike="noStrike">
-              <a:solidFill>
-                <a:srgbClr val="000000"/>
-              </a:solidFill>
-              <a:uFill>
-                <a:solidFill>
-                  <a:srgbClr val="ffffff"/>
-                </a:solidFill>
-              </a:uFill>
+            <a:endParaRPr b="0" lang="en-US" sz="4400" spc="-1" strike="noStrike">
               <a:latin typeface="Arial"/>
             </a:endParaRPr>
           </a:p>
@@ -435,24 +375,18 @@
         <p:spPr>
           <a:xfrm>
             <a:off x="504000" y="1768680"/>
-            <a:ext cx="9072000" cy="4384080"/>
-          </a:xfrm>
-          <a:prstGeom prst="rect">
-            <a:avLst/>
-          </a:prstGeom>
-        </p:spPr>
-        <p:txBody>
-          <a:bodyPr lIns="0" rIns="0" tIns="0" bIns="0"/>
-          <a:p>
-            <a:endParaRPr b="0" lang="fr-FR" sz="3200" spc="-1" strike="noStrike">
-              <a:solidFill>
-                <a:srgbClr val="000000"/>
-              </a:solidFill>
-              <a:uFill>
-                <a:solidFill>
-                  <a:srgbClr val="ffffff"/>
-                </a:solidFill>
-              </a:uFill>
+            <a:ext cx="2920680" cy="2090880"/>
+          </a:xfrm>
+          <a:prstGeom prst="rect">
+            <a:avLst/>
+          </a:prstGeom>
+        </p:spPr>
+        <p:txBody>
+          <a:bodyPr lIns="0" rIns="0" tIns="0" bIns="0">
+            <a:normAutofit/>
+          </a:bodyPr>
+          <a:p>
+            <a:endParaRPr b="0" lang="en-US" sz="3200" spc="-1" strike="noStrike">
               <a:latin typeface="Arial"/>
             </a:endParaRPr>
           </a:p>
@@ -470,76 +404,144 @@
         </p:nvSpPr>
         <p:spPr>
           <a:xfrm>
-            <a:off x="504000" y="1768680"/>
-            <a:ext cx="9072000" cy="4384080"/>
-          </a:xfrm>
-          <a:prstGeom prst="rect">
-            <a:avLst/>
-          </a:prstGeom>
-        </p:spPr>
-        <p:txBody>
-          <a:bodyPr lIns="0" rIns="0" tIns="0" bIns="0"/>
-          <a:p>
-            <a:endParaRPr b="0" lang="fr-FR" sz="3200" spc="-1" strike="noStrike">
-              <a:solidFill>
-                <a:srgbClr val="000000"/>
-              </a:solidFill>
-              <a:uFill>
-                <a:solidFill>
-                  <a:srgbClr val="ffffff"/>
-                </a:solidFill>
-              </a:uFill>
-              <a:latin typeface="Arial"/>
-            </a:endParaRPr>
-          </a:p>
-        </p:txBody>
-      </p:sp>
-      <p:pic>
-        <p:nvPicPr>
-          <p:cNvPr id="34" name="" descr=""/>
-          <p:cNvPicPr/>
-          <p:nvPr/>
-        </p:nvPicPr>
-        <p:blipFill>
-          <a:blip r:embed="rId2"/>
-          <a:stretch/>
-        </p:blipFill>
-        <p:spPr>
-          <a:xfrm>
-            <a:off x="2292480" y="1768680"/>
-            <a:ext cx="5494680" cy="4384080"/>
-          </a:xfrm>
-          <a:prstGeom prst="rect">
-            <a:avLst/>
-          </a:prstGeom>
-          <a:ln>
-            <a:noFill/>
-          </a:ln>
-        </p:spPr>
-      </p:pic>
-      <p:pic>
-        <p:nvPicPr>
-          <p:cNvPr id="35" name="" descr=""/>
-          <p:cNvPicPr/>
-          <p:nvPr/>
-        </p:nvPicPr>
-        <p:blipFill>
-          <a:blip r:embed="rId3"/>
-          <a:stretch/>
-        </p:blipFill>
-        <p:spPr>
-          <a:xfrm>
-            <a:off x="2292480" y="1768680"/>
-            <a:ext cx="5494680" cy="4384080"/>
-          </a:xfrm>
-          <a:prstGeom prst="rect">
-            <a:avLst/>
-          </a:prstGeom>
-          <a:ln>
-            <a:noFill/>
-          </a:ln>
-        </p:spPr>
-      </p:pic>
+            <a:off x="3571200" y="1768680"/>
+            <a:ext cx="2920680" cy="2090880"/>
+          </a:xfrm>
+          <a:prstGeom prst="rect">
+            <a:avLst/>
+          </a:prstGeom>
+        </p:spPr>
+        <p:txBody>
+          <a:bodyPr lIns="0" rIns="0" tIns="0" bIns="0">
+            <a:normAutofit/>
+          </a:bodyPr>
+          <a:p>
+            <a:endParaRPr b="0" lang="en-US" sz="3200" spc="-1" strike="noStrike">
+              <a:latin typeface="Arial"/>
+            </a:endParaRPr>
+          </a:p>
+        </p:txBody>
+      </p:sp>
+      <p:sp>
+        <p:nvSpPr>
+          <p:cNvPr id="34" name="PlaceHolder 4"/>
+          <p:cNvSpPr>
+            <a:spLocks noGrp="1"/>
+          </p:cNvSpPr>
+          <p:nvPr>
+            <p:ph type="body"/>
+          </p:nvPr>
+        </p:nvSpPr>
+        <p:spPr>
+          <a:xfrm>
+            <a:off x="6638040" y="1768680"/>
+            <a:ext cx="2920680" cy="2090880"/>
+          </a:xfrm>
+          <a:prstGeom prst="rect">
+            <a:avLst/>
+          </a:prstGeom>
+        </p:spPr>
+        <p:txBody>
+          <a:bodyPr lIns="0" rIns="0" tIns="0" bIns="0">
+            <a:normAutofit/>
+          </a:bodyPr>
+          <a:p>
+            <a:endParaRPr b="0" lang="en-US" sz="3200" spc="-1" strike="noStrike">
+              <a:latin typeface="Arial"/>
+            </a:endParaRPr>
+          </a:p>
+        </p:txBody>
+      </p:sp>
+      <p:sp>
+        <p:nvSpPr>
+          <p:cNvPr id="35" name="PlaceHolder 5"/>
+          <p:cNvSpPr>
+            <a:spLocks noGrp="1"/>
+          </p:cNvSpPr>
+          <p:nvPr>
+            <p:ph type="body"/>
+          </p:nvPr>
+        </p:nvSpPr>
+        <p:spPr>
+          <a:xfrm>
+            <a:off x="6638040" y="4058640"/>
+            <a:ext cx="2920680" cy="2090880"/>
+          </a:xfrm>
+          <a:prstGeom prst="rect">
+            <a:avLst/>
+          </a:prstGeom>
+        </p:spPr>
+        <p:txBody>
+          <a:bodyPr lIns="0" rIns="0" tIns="0" bIns="0">
+            <a:normAutofit/>
+          </a:bodyPr>
+          <a:p>
+            <a:endParaRPr b="0" lang="en-US" sz="3200" spc="-1" strike="noStrike">
+              <a:latin typeface="Arial"/>
+            </a:endParaRPr>
+          </a:p>
+        </p:txBody>
+      </p:sp>
+      <p:sp>
+        <p:nvSpPr>
+          <p:cNvPr id="36" name="PlaceHolder 6"/>
+          <p:cNvSpPr>
+            <a:spLocks noGrp="1"/>
+          </p:cNvSpPr>
+          <p:nvPr>
+            <p:ph type="body"/>
+          </p:nvPr>
+        </p:nvSpPr>
+        <p:spPr>
+          <a:xfrm>
+            <a:off x="3571200" y="4058640"/>
+            <a:ext cx="2920680" cy="2090880"/>
+          </a:xfrm>
+          <a:prstGeom prst="rect">
+            <a:avLst/>
+          </a:prstGeom>
+        </p:spPr>
+        <p:txBody>
+          <a:bodyPr lIns="0" rIns="0" tIns="0" bIns="0">
+            <a:normAutofit/>
+          </a:bodyPr>
+          <a:p>
+            <a:endParaRPr b="0" lang="en-US" sz="3200" spc="-1" strike="noStrike">
+              <a:latin typeface="Arial"/>
+            </a:endParaRPr>
+          </a:p>
+        </p:txBody>
+      </p:sp>
+      <p:sp>
+        <p:nvSpPr>
+          <p:cNvPr id="37" name="PlaceHolder 7"/>
+          <p:cNvSpPr>
+            <a:spLocks noGrp="1"/>
+          </p:cNvSpPr>
+          <p:nvPr>
+            <p:ph type="body"/>
+          </p:nvPr>
+        </p:nvSpPr>
+        <p:spPr>
+          <a:xfrm>
+            <a:off x="504000" y="4058640"/>
+            <a:ext cx="2920680" cy="2090880"/>
+          </a:xfrm>
+          <a:prstGeom prst="rect">
+            <a:avLst/>
+          </a:prstGeom>
+        </p:spPr>
+        <p:txBody>
+          <a:bodyPr lIns="0" rIns="0" tIns="0" bIns="0">
+            <a:normAutofit/>
+          </a:bodyPr>
+          <a:p>
+            <a:endParaRPr b="0" lang="en-US" sz="3200" spc="-1" strike="noStrike">
+              <a:latin typeface="Arial"/>
+            </a:endParaRPr>
+          </a:p>
+        </p:txBody>
+      </p:sp>
     </p:spTree>
   </p:cSld>
 </p:sldLayout>
@@ -575,7 +577,7 @@
         <p:spPr>
           <a:xfrm>
             <a:off x="504000" y="301320"/>
-            <a:ext cx="9071280" cy="1262160"/>
+            <a:ext cx="9070920" cy="1261800"/>
           </a:xfrm>
           <a:prstGeom prst="rect">
             <a:avLst/>
@@ -585,15 +587,7 @@
           <a:bodyPr lIns="0" rIns="0" tIns="0" bIns="0" anchor="ctr"/>
           <a:p>
             <a:pPr algn="ctr"/>
-            <a:endParaRPr b="0" lang="fr-FR" sz="4400" spc="-1" strike="noStrike">
-              <a:solidFill>
-                <a:srgbClr val="000000"/>
-              </a:solidFill>
-              <a:uFill>
-                <a:solidFill>
-                  <a:srgbClr val="ffffff"/>
-                </a:solidFill>
-              </a:uFill>
+            <a:endParaRPr b="0" lang="en-US" sz="4400" spc="-1" strike="noStrike">
               <a:latin typeface="Arial"/>
             </a:endParaRPr>
           </a:p>
@@ -612,7 +606,7 @@
         <p:spPr>
           <a:xfrm>
             <a:off x="504000" y="1768680"/>
-            <a:ext cx="9072000" cy="4384080"/>
+            <a:ext cx="9071640" cy="4383720"/>
           </a:xfrm>
           <a:prstGeom prst="rect">
             <a:avLst/>
@@ -622,15 +616,7 @@
           <a:bodyPr lIns="0" rIns="0" tIns="0" bIns="0" anchor="ctr"/>
           <a:p>
             <a:pPr algn="ctr"/>
-            <a:endParaRPr b="0" lang="fr-FR" sz="3200" spc="-1" strike="noStrike">
-              <a:solidFill>
-                <a:srgbClr val="000000"/>
-              </a:solidFill>
-              <a:uFill>
-                <a:solidFill>
-                  <a:srgbClr val="ffffff"/>
-                </a:solidFill>
-              </a:uFill>
+            <a:endParaRPr b="0" lang="en-US" sz="3200" spc="-1" strike="noStrike">
               <a:latin typeface="Arial"/>
             </a:endParaRPr>
           </a:p>
@@ -671,7 +657,7 @@
         <p:spPr>
           <a:xfrm>
             <a:off x="504000" y="301320"/>
-            <a:ext cx="9071280" cy="1262160"/>
+            <a:ext cx="9070920" cy="1261800"/>
           </a:xfrm>
           <a:prstGeom prst="rect">
             <a:avLst/>
@@ -681,15 +667,7 @@
           <a:bodyPr lIns="0" rIns="0" tIns="0" bIns="0" anchor="ctr"/>
           <a:p>
             <a:pPr algn="ctr"/>
-            <a:endParaRPr b="0" lang="fr-FR" sz="4400" spc="-1" strike="noStrike">
-              <a:solidFill>
-                <a:srgbClr val="000000"/>
-              </a:solidFill>
-              <a:uFill>
-                <a:solidFill>
-                  <a:srgbClr val="ffffff"/>
-                </a:solidFill>
-              </a:uFill>
+            <a:endParaRPr b="0" lang="en-US" sz="4400" spc="-1" strike="noStrike">
               <a:latin typeface="Arial"/>
             </a:endParaRPr>
           </a:p>
@@ -708,24 +686,18 @@
         <p:spPr>
           <a:xfrm>
             <a:off x="504000" y="1768680"/>
-            <a:ext cx="9072000" cy="4384080"/>
-          </a:xfrm>
-          <a:prstGeom prst="rect">
-            <a:avLst/>
-          </a:prstGeom>
-        </p:spPr>
-        <p:txBody>
-          <a:bodyPr lIns="0" rIns="0" tIns="0" bIns="0"/>
-          <a:p>
-            <a:endParaRPr b="0" lang="fr-FR" sz="3200" spc="-1" strike="noStrike">
-              <a:solidFill>
-                <a:srgbClr val="000000"/>
-              </a:solidFill>
-              <a:uFill>
-                <a:solidFill>
-                  <a:srgbClr val="ffffff"/>
-                </a:solidFill>
-              </a:uFill>
+            <a:ext cx="9071640" cy="4383720"/>
+          </a:xfrm>
+          <a:prstGeom prst="rect">
+            <a:avLst/>
+          </a:prstGeom>
+        </p:spPr>
+        <p:txBody>
+          <a:bodyPr lIns="0" rIns="0" tIns="0" bIns="0">
+            <a:normAutofit/>
+          </a:bodyPr>
+          <a:p>
+            <a:endParaRPr b="0" lang="en-US" sz="3200" spc="-1" strike="noStrike">
               <a:latin typeface="Arial"/>
             </a:endParaRPr>
           </a:p>
@@ -766,7 +738,7 @@
         <p:spPr>
           <a:xfrm>
             <a:off x="504000" y="301320"/>
-            <a:ext cx="9071280" cy="1262160"/>
+            <a:ext cx="9070920" cy="1261800"/>
           </a:xfrm>
           <a:prstGeom prst="rect">
             <a:avLst/>
@@ -776,15 +748,7 @@
           <a:bodyPr lIns="0" rIns="0" tIns="0" bIns="0" anchor="ctr"/>
           <a:p>
             <a:pPr algn="ctr"/>
-            <a:endParaRPr b="0" lang="fr-FR" sz="4400" spc="-1" strike="noStrike">
-              <a:solidFill>
-                <a:srgbClr val="000000"/>
-              </a:solidFill>
-              <a:uFill>
-                <a:solidFill>
-                  <a:srgbClr val="ffffff"/>
-                </a:solidFill>
-              </a:uFill>
+            <a:endParaRPr b="0" lang="en-US" sz="4400" spc="-1" strike="noStrike">
               <a:latin typeface="Arial"/>
             </a:endParaRPr>
           </a:p>
@@ -803,24 +767,18 @@
         <p:spPr>
           <a:xfrm>
             <a:off x="504000" y="1768680"/>
-            <a:ext cx="4426920" cy="4384080"/>
-          </a:xfrm>
-          <a:prstGeom prst="rect">
-            <a:avLst/>
-          </a:prstGeom>
-        </p:spPr>
-        <p:txBody>
-          <a:bodyPr lIns="0" rIns="0" tIns="0" bIns="0"/>
-          <a:p>
-            <a:endParaRPr b="0" lang="fr-FR" sz="3200" spc="-1" strike="noStrike">
-              <a:solidFill>
-                <a:srgbClr val="000000"/>
-              </a:solidFill>
-              <a:uFill>
-                <a:solidFill>
-                  <a:srgbClr val="ffffff"/>
-                </a:solidFill>
-              </a:uFill>
+            <a:ext cx="4426920" cy="4383720"/>
+          </a:xfrm>
+          <a:prstGeom prst="rect">
+            <a:avLst/>
+          </a:prstGeom>
+        </p:spPr>
+        <p:txBody>
+          <a:bodyPr lIns="0" rIns="0" tIns="0" bIns="0">
+            <a:normAutofit/>
+          </a:bodyPr>
+          <a:p>
+            <a:endParaRPr b="0" lang="en-US" sz="3200" spc="-1" strike="noStrike">
               <a:latin typeface="Arial"/>
             </a:endParaRPr>
           </a:p>
@@ -839,24 +797,18 @@
         <p:spPr>
           <a:xfrm>
             <a:off x="5152680" y="1768680"/>
-            <a:ext cx="4426920" cy="4384080"/>
-          </a:xfrm>
-          <a:prstGeom prst="rect">
-            <a:avLst/>
-          </a:prstGeom>
-        </p:spPr>
-        <p:txBody>
-          <a:bodyPr lIns="0" rIns="0" tIns="0" bIns="0"/>
-          <a:p>
-            <a:endParaRPr b="0" lang="fr-FR" sz="3200" spc="-1" strike="noStrike">
-              <a:solidFill>
-                <a:srgbClr val="000000"/>
-              </a:solidFill>
-              <a:uFill>
-                <a:solidFill>
-                  <a:srgbClr val="ffffff"/>
-                </a:solidFill>
-              </a:uFill>
+            <a:ext cx="4426920" cy="4383720"/>
+          </a:xfrm>
+          <a:prstGeom prst="rect">
+            <a:avLst/>
+          </a:prstGeom>
+        </p:spPr>
+        <p:txBody>
+          <a:bodyPr lIns="0" rIns="0" tIns="0" bIns="0">
+            <a:normAutofit/>
+          </a:bodyPr>
+          <a:p>
+            <a:endParaRPr b="0" lang="en-US" sz="3200" spc="-1" strike="noStrike">
               <a:latin typeface="Arial"/>
             </a:endParaRPr>
           </a:p>
@@ -897,7 +849,7 @@
         <p:spPr>
           <a:xfrm>
             <a:off x="504000" y="301320"/>
-            <a:ext cx="9071280" cy="1262160"/>
+            <a:ext cx="9070920" cy="1261800"/>
           </a:xfrm>
           <a:prstGeom prst="rect">
             <a:avLst/>
@@ -907,15 +859,7 @@
           <a:bodyPr lIns="0" rIns="0" tIns="0" bIns="0" anchor="ctr"/>
           <a:p>
             <a:pPr algn="ctr"/>
-            <a:endParaRPr b="0" lang="fr-FR" sz="4400" spc="-1" strike="noStrike">
-              <a:solidFill>
-                <a:srgbClr val="000000"/>
-              </a:solidFill>
-              <a:uFill>
-                <a:solidFill>
-                  <a:srgbClr val="ffffff"/>
-                </a:solidFill>
-              </a:uFill>
+            <a:endParaRPr b="0" lang="en-US" sz="4400" spc="-1" strike="noStrike">
               <a:latin typeface="Arial"/>
             </a:endParaRPr>
           </a:p>
@@ -956,7 +900,7 @@
         <p:spPr>
           <a:xfrm>
             <a:off x="504000" y="301320"/>
-            <a:ext cx="9071280" cy="5851800"/>
+            <a:ext cx="9070920" cy="5850360"/>
           </a:xfrm>
           <a:prstGeom prst="rect">
             <a:avLst/>
@@ -966,15 +910,7 @@
           <a:bodyPr lIns="0" rIns="0" tIns="0" bIns="0" anchor="ctr"/>
           <a:p>
             <a:pPr algn="ctr"/>
-            <a:endParaRPr b="0" lang="fr-FR" sz="3200" spc="-1" strike="noStrike">
-              <a:solidFill>
-                <a:srgbClr val="000000"/>
-              </a:solidFill>
-              <a:uFill>
-                <a:solidFill>
-                  <a:srgbClr val="ffffff"/>
-                </a:solidFill>
-              </a:uFill>
+            <a:endParaRPr b="0" lang="en-US" sz="3200" spc="-1" strike="noStrike">
               <a:latin typeface="Arial"/>
             </a:endParaRPr>
           </a:p>
@@ -1015,7 +951,7 @@
         <p:spPr>
           <a:xfrm>
             <a:off x="504000" y="301320"/>
-            <a:ext cx="9071280" cy="1262160"/>
+            <a:ext cx="9070920" cy="1261800"/>
           </a:xfrm>
           <a:prstGeom prst="rect">
             <a:avLst/>
@@ -1025,15 +961,7 @@
           <a:bodyPr lIns="0" rIns="0" tIns="0" bIns="0" anchor="ctr"/>
           <a:p>
             <a:pPr algn="ctr"/>
-            <a:endParaRPr b="0" lang="fr-FR" sz="4400" spc="-1" strike="noStrike">
-              <a:solidFill>
-                <a:srgbClr val="000000"/>
-              </a:solidFill>
-              <a:uFill>
-                <a:solidFill>
-                  <a:srgbClr val="ffffff"/>
-                </a:solidFill>
-              </a:uFill>
+            <a:endParaRPr b="0" lang="en-US" sz="4400" spc="-1" strike="noStrike">
               <a:latin typeface="Arial"/>
             </a:endParaRPr>
           </a:p>
@@ -1059,17 +987,11 @@
           </a:prstGeom>
         </p:spPr>
         <p:txBody>
-          <a:bodyPr lIns="0" rIns="0" tIns="0" bIns="0"/>
-          <a:p>
-            <a:endParaRPr b="0" lang="fr-FR" sz="3200" spc="-1" strike="noStrike">
-              <a:solidFill>
-                <a:srgbClr val="000000"/>
-              </a:solidFill>
-              <a:uFill>
-                <a:solidFill>
-                  <a:srgbClr val="ffffff"/>
-                </a:solidFill>
-              </a:uFill>
+          <a:bodyPr lIns="0" rIns="0" tIns="0" bIns="0">
+            <a:normAutofit/>
+          </a:bodyPr>
+          <a:p>
+            <a:endParaRPr b="0" lang="en-US" sz="3200" spc="-1" strike="noStrike">
               <a:latin typeface="Arial"/>
             </a:endParaRPr>
           </a:p>
@@ -1095,17 +1017,11 @@
           </a:prstGeom>
         </p:spPr>
         <p:txBody>
-          <a:bodyPr lIns="0" rIns="0" tIns="0" bIns="0"/>
-          <a:p>
-            <a:endParaRPr b="0" lang="fr-FR" sz="3200" spc="-1" strike="noStrike">
-              <a:solidFill>
-                <a:srgbClr val="000000"/>
-              </a:solidFill>
-              <a:uFill>
-                <a:solidFill>
-                  <a:srgbClr val="ffffff"/>
-                </a:solidFill>
-              </a:uFill>
+          <a:bodyPr lIns="0" rIns="0" tIns="0" bIns="0">
+            <a:normAutofit/>
+          </a:bodyPr>
+          <a:p>
+            <a:endParaRPr b="0" lang="en-US" sz="3200" spc="-1" strike="noStrike">
               <a:latin typeface="Arial"/>
             </a:endParaRPr>
           </a:p>
@@ -1124,24 +1040,18 @@
         <p:spPr>
           <a:xfrm>
             <a:off x="5152680" y="1768680"/>
-            <a:ext cx="4426920" cy="4384080"/>
-          </a:xfrm>
-          <a:prstGeom prst="rect">
-            <a:avLst/>
-          </a:prstGeom>
-        </p:spPr>
-        <p:txBody>
-          <a:bodyPr lIns="0" rIns="0" tIns="0" bIns="0"/>
-          <a:p>
-            <a:endParaRPr b="0" lang="fr-FR" sz="3200" spc="-1" strike="noStrike">
-              <a:solidFill>
-                <a:srgbClr val="000000"/>
-              </a:solidFill>
-              <a:uFill>
-                <a:solidFill>
-                  <a:srgbClr val="ffffff"/>
-                </a:solidFill>
-              </a:uFill>
+            <a:ext cx="4426920" cy="4383720"/>
+          </a:xfrm>
+          <a:prstGeom prst="rect">
+            <a:avLst/>
+          </a:prstGeom>
+        </p:spPr>
+        <p:txBody>
+          <a:bodyPr lIns="0" rIns="0" tIns="0" bIns="0">
+            <a:normAutofit/>
+          </a:bodyPr>
+          <a:p>
+            <a:endParaRPr b="0" lang="en-US" sz="3200" spc="-1" strike="noStrike">
               <a:latin typeface="Arial"/>
             </a:endParaRPr>
           </a:p>
@@ -1182,7 +1092,7 @@
         <p:spPr>
           <a:xfrm>
             <a:off x="504000" y="301320"/>
-            <a:ext cx="9071280" cy="1262160"/>
+            <a:ext cx="9070920" cy="1261800"/>
           </a:xfrm>
           <a:prstGeom prst="rect">
             <a:avLst/>
@@ -1192,15 +1102,7 @@
           <a:bodyPr lIns="0" rIns="0" tIns="0" bIns="0" anchor="ctr"/>
           <a:p>
             <a:pPr algn="ctr"/>
-            <a:endParaRPr b="0" lang="fr-FR" sz="4400" spc="-1" strike="noStrike">
-              <a:solidFill>
-                <a:srgbClr val="000000"/>
-              </a:solidFill>
-              <a:uFill>
-                <a:solidFill>
-                  <a:srgbClr val="ffffff"/>
-                </a:solidFill>
-              </a:uFill>
+            <a:endParaRPr b="0" lang="en-US" sz="4400" spc="-1" strike="noStrike">
               <a:latin typeface="Arial"/>
             </a:endParaRPr>
           </a:p>
@@ -1219,24 +1121,18 @@
         <p:spPr>
           <a:xfrm>
             <a:off x="504000" y="1768680"/>
-            <a:ext cx="4426920" cy="4384080"/>
-          </a:xfrm>
-          <a:prstGeom prst="rect">
-            <a:avLst/>
-          </a:prstGeom>
-        </p:spPr>
-        <p:txBody>
-          <a:bodyPr lIns="0" rIns="0" tIns="0" bIns="0"/>
-          <a:p>
-            <a:endParaRPr b="0" lang="fr-FR" sz="3200" spc="-1" strike="noStrike">
-              <a:solidFill>
-                <a:srgbClr val="000000"/>
-              </a:solidFill>
-              <a:uFill>
-                <a:solidFill>
-                  <a:srgbClr val="ffffff"/>
-                </a:solidFill>
-              </a:uFill>
+            <a:ext cx="4426920" cy="4383720"/>
+          </a:xfrm>
+          <a:prstGeom prst="rect">
+            <a:avLst/>
+          </a:prstGeom>
+        </p:spPr>
+        <p:txBody>
+          <a:bodyPr lIns="0" rIns="0" tIns="0" bIns="0">
+            <a:normAutofit/>
+          </a:bodyPr>
+          <a:p>
+            <a:endParaRPr b="0" lang="en-US" sz="3200" spc="-1" strike="noStrike">
               <a:latin typeface="Arial"/>
             </a:endParaRPr>
           </a:p>
@@ -1262,17 +1158,11 @@
           </a:prstGeom>
         </p:spPr>
         <p:txBody>
-          <a:bodyPr lIns="0" rIns="0" tIns="0" bIns="0"/>
-          <a:p>
-            <a:endParaRPr b="0" lang="fr-FR" sz="3200" spc="-1" strike="noStrike">
-              <a:solidFill>
-                <a:srgbClr val="000000"/>
-              </a:solidFill>
-              <a:uFill>
-                <a:solidFill>
-                  <a:srgbClr val="ffffff"/>
-                </a:solidFill>
-              </a:uFill>
+          <a:bodyPr lIns="0" rIns="0" tIns="0" bIns="0">
+            <a:normAutofit/>
+          </a:bodyPr>
+          <a:p>
+            <a:endParaRPr b="0" lang="en-US" sz="3200" spc="-1" strike="noStrike">
               <a:latin typeface="Arial"/>
             </a:endParaRPr>
           </a:p>
@@ -1298,17 +1188,11 @@
           </a:prstGeom>
         </p:spPr>
         <p:txBody>
-          <a:bodyPr lIns="0" rIns="0" tIns="0" bIns="0"/>
-          <a:p>
-            <a:endParaRPr b="0" lang="fr-FR" sz="3200" spc="-1" strike="noStrike">
-              <a:solidFill>
-                <a:srgbClr val="000000"/>
-              </a:solidFill>
-              <a:uFill>
-                <a:solidFill>
-                  <a:srgbClr val="ffffff"/>
-                </a:solidFill>
-              </a:uFill>
+          <a:bodyPr lIns="0" rIns="0" tIns="0" bIns="0">
+            <a:normAutofit/>
+          </a:bodyPr>
+          <a:p>
+            <a:endParaRPr b="0" lang="en-US" sz="3200" spc="-1" strike="noStrike">
               <a:latin typeface="Arial"/>
             </a:endParaRPr>
           </a:p>
@@ -1349,7 +1233,7 @@
         <p:spPr>
           <a:xfrm>
             <a:off x="504000" y="301320"/>
-            <a:ext cx="9071280" cy="1262160"/>
+            <a:ext cx="9070920" cy="1261800"/>
           </a:xfrm>
           <a:prstGeom prst="rect">
             <a:avLst/>
@@ -1359,15 +1243,7 @@
           <a:bodyPr lIns="0" rIns="0" tIns="0" bIns="0" anchor="ctr"/>
           <a:p>
             <a:pPr algn="ctr"/>
-            <a:endParaRPr b="0" lang="fr-FR" sz="4400" spc="-1" strike="noStrike">
-              <a:solidFill>
-                <a:srgbClr val="000000"/>
-              </a:solidFill>
-              <a:uFill>
-                <a:solidFill>
-                  <a:srgbClr val="ffffff"/>
-                </a:solidFill>
-              </a:uFill>
+            <a:endParaRPr b="0" lang="en-US" sz="4400" spc="-1" strike="noStrike">
               <a:latin typeface="Arial"/>
             </a:endParaRPr>
           </a:p>
@@ -1393,17 +1269,11 @@
           </a:prstGeom>
         </p:spPr>
         <p:txBody>
-          <a:bodyPr lIns="0" rIns="0" tIns="0" bIns="0"/>
-          <a:p>
-            <a:endParaRPr b="0" lang="fr-FR" sz="3200" spc="-1" strike="noStrike">
-              <a:solidFill>
-                <a:srgbClr val="000000"/>
-              </a:solidFill>
-              <a:uFill>
-                <a:solidFill>
-                  <a:srgbClr val="ffffff"/>
-                </a:solidFill>
-              </a:uFill>
+          <a:bodyPr lIns="0" rIns="0" tIns="0" bIns="0">
+            <a:normAutofit/>
+          </a:bodyPr>
+          <a:p>
+            <a:endParaRPr b="0" lang="en-US" sz="3200" spc="-1" strike="noStrike">
               <a:latin typeface="Arial"/>
             </a:endParaRPr>
           </a:p>
@@ -1429,17 +1299,11 @@
           </a:prstGeom>
         </p:spPr>
         <p:txBody>
-          <a:bodyPr lIns="0" rIns="0" tIns="0" bIns="0"/>
-          <a:p>
-            <a:endParaRPr b="0" lang="fr-FR" sz="3200" spc="-1" strike="noStrike">
-              <a:solidFill>
-                <a:srgbClr val="000000"/>
-              </a:solidFill>
-              <a:uFill>
-                <a:solidFill>
-                  <a:srgbClr val="ffffff"/>
-                </a:solidFill>
-              </a:uFill>
+          <a:bodyPr lIns="0" rIns="0" tIns="0" bIns="0">
+            <a:normAutofit/>
+          </a:bodyPr>
+          <a:p>
+            <a:endParaRPr b="0" lang="en-US" sz="3200" spc="-1" strike="noStrike">
               <a:latin typeface="Arial"/>
             </a:endParaRPr>
           </a:p>
@@ -1458,24 +1322,18 @@
         <p:spPr>
           <a:xfrm>
             <a:off x="504000" y="4058640"/>
-            <a:ext cx="9072000" cy="2090880"/>
-          </a:xfrm>
-          <a:prstGeom prst="rect">
-            <a:avLst/>
-          </a:prstGeom>
-        </p:spPr>
-        <p:txBody>
-          <a:bodyPr lIns="0" rIns="0" tIns="0" bIns="0"/>
-          <a:p>
-            <a:endParaRPr b="0" lang="fr-FR" sz="3200" spc="-1" strike="noStrike">
-              <a:solidFill>
-                <a:srgbClr val="000000"/>
-              </a:solidFill>
-              <a:uFill>
-                <a:solidFill>
-                  <a:srgbClr val="ffffff"/>
-                </a:solidFill>
-              </a:uFill>
+            <a:ext cx="9071640" cy="2090880"/>
+          </a:xfrm>
+          <a:prstGeom prst="rect">
+            <a:avLst/>
+          </a:prstGeom>
+        </p:spPr>
+        <p:txBody>
+          <a:bodyPr lIns="0" rIns="0" tIns="0" bIns="0">
+            <a:normAutofit/>
+          </a:bodyPr>
+          <a:p>
+            <a:endParaRPr b="0" lang="en-US" sz="3200" spc="-1" strike="noStrike">
               <a:latin typeface="Arial"/>
             </a:endParaRPr>
           </a:p>
@@ -1516,7 +1374,7 @@
         <p:spPr>
           <a:xfrm>
             <a:off x="504000" y="301320"/>
-            <a:ext cx="9071280" cy="1262160"/>
+            <a:ext cx="9070920" cy="1261800"/>
           </a:xfrm>
           <a:prstGeom prst="rect">
             <a:avLst/>
@@ -1525,16 +1383,13 @@
         <p:txBody>
           <a:bodyPr lIns="0" rIns="0" tIns="0" bIns="0" anchor="ctr"/>
           <a:p>
-            <a:pPr algn="ctr"/>
-            <a:endParaRPr b="0" lang="fr-FR" sz="4400" spc="-1" strike="noStrike">
-              <a:solidFill>
-                <a:srgbClr val="000000"/>
-              </a:solidFill>
-              <a:uFill>
-                <a:solidFill>
-                  <a:srgbClr val="ffffff"/>
-                </a:solidFill>
-              </a:uFill>
+            <a:r>
+              <a:rPr b="0" lang="en-US" sz="1800" spc="-1" strike="noStrike">
+                <a:latin typeface="Arial"/>
+              </a:rPr>
+              <a:t>Click to edit the title text format</a:t>
+            </a:r>
+            <a:endParaRPr b="0" lang="en-US" sz="1800" spc="-1" strike="noStrike">
               <a:latin typeface="Arial"/>
             </a:endParaRPr>
           </a:p>
@@ -1553,7 +1408,7 @@
         <p:spPr>
           <a:xfrm>
             <a:off x="504000" y="1768680"/>
-            <a:ext cx="9072000" cy="4384080"/>
+            <a:ext cx="9071640" cy="4383720"/>
           </a:xfrm>
           <a:prstGeom prst="rect">
             <a:avLst/>
@@ -1563,6 +1418,9 @@
           <a:bodyPr lIns="0" rIns="0" tIns="0" bIns="0"/>
           <a:p>
             <a:pPr marL="432000" indent="-324000">
+              <a:spcBef>
+                <a:spcPts val="1417"/>
+              </a:spcBef>
               <a:buClr>
                 <a:srgbClr val="000000"/>
               </a:buClr>
@@ -1571,33 +1429,20 @@
               <a:buChar char=""/>
             </a:pPr>
             <a:r>
-              <a:rPr b="0" lang="fr-FR" sz="3200" spc="-1" strike="noStrike">
-                <a:solidFill>
-                  <a:srgbClr val="000000"/>
-                </a:solidFill>
-                <a:uFill>
-                  <a:solidFill>
-                    <a:srgbClr val="ffffff"/>
-                  </a:solidFill>
-                </a:uFill>
+              <a:rPr b="0" lang="en-US" sz="1800" spc="-1" strike="noStrike">
                 <a:latin typeface="Arial"/>
               </a:rPr>
               <a:t>Click to edit the outline text format</a:t>
             </a:r>
-            <a:endParaRPr b="0" lang="fr-FR" sz="3200" spc="-1" strike="noStrike">
-              <a:solidFill>
-                <a:srgbClr val="000000"/>
-              </a:solidFill>
-              <a:uFill>
-                <a:solidFill>
-                  <a:srgbClr val="ffffff"/>
-                </a:solidFill>
-              </a:uFill>
+            <a:endParaRPr b="0" lang="en-US" sz="1800" spc="-1" strike="noStrike">
               <a:latin typeface="Arial"/>
             </a:endParaRPr>
           </a:p>
           <a:p>
             <a:pPr lvl="1" marL="864000" indent="-324000">
+              <a:spcBef>
+                <a:spcPts val="1134"/>
+              </a:spcBef>
               <a:buClr>
                 <a:srgbClr val="000000"/>
               </a:buClr>
@@ -1606,33 +1451,20 @@
               <a:buChar char=""/>
             </a:pPr>
             <a:r>
-              <a:rPr b="0" lang="fr-FR" sz="2800" spc="-1" strike="noStrike">
-                <a:solidFill>
-                  <a:srgbClr val="000000"/>
-                </a:solidFill>
-                <a:uFill>
-                  <a:solidFill>
-                    <a:srgbClr val="ffffff"/>
-                  </a:solidFill>
-                </a:uFill>
+              <a:rPr b="0" lang="en-US" sz="1800" spc="-1" strike="noStrike">
                 <a:latin typeface="Arial"/>
               </a:rPr>
               <a:t>Second Outline Level</a:t>
             </a:r>
-            <a:endParaRPr b="0" lang="fr-FR" sz="2800" spc="-1" strike="noStrike">
-              <a:solidFill>
-                <a:srgbClr val="000000"/>
-              </a:solidFill>
-              <a:uFill>
-                <a:solidFill>
-                  <a:srgbClr val="ffffff"/>
-                </a:solidFill>
-              </a:uFill>
+            <a:endParaRPr b="0" lang="en-US" sz="1800" spc="-1" strike="noStrike">
               <a:latin typeface="Arial"/>
             </a:endParaRPr>
           </a:p>
           <a:p>
             <a:pPr lvl="2" marL="1296000" indent="-288000">
+              <a:spcBef>
+                <a:spcPts val="850"/>
+              </a:spcBef>
               <a:buClr>
                 <a:srgbClr val="000000"/>
               </a:buClr>
@@ -1641,33 +1473,20 @@
               <a:buChar char=""/>
             </a:pPr>
             <a:r>
-              <a:rPr b="0" lang="fr-FR" sz="2400" spc="-1" strike="noStrike">
-                <a:solidFill>
-                  <a:srgbClr val="000000"/>
-                </a:solidFill>
-                <a:uFill>
-                  <a:solidFill>
-                    <a:srgbClr val="ffffff"/>
-                  </a:solidFill>
-                </a:uFill>
+              <a:rPr b="0" lang="en-US" sz="1800" spc="-1" strike="noStrike">
                 <a:latin typeface="Arial"/>
               </a:rPr>
               <a:t>Third Outline Level</a:t>
             </a:r>
-            <a:endParaRPr b="0" lang="fr-FR" sz="2400" spc="-1" strike="noStrike">
-              <a:solidFill>
-                <a:srgbClr val="000000"/>
-              </a:solidFill>
-              <a:uFill>
-                <a:solidFill>
-                  <a:srgbClr val="ffffff"/>
-                </a:solidFill>
-              </a:uFill>
+            <a:endParaRPr b="0" lang="en-US" sz="1800" spc="-1" strike="noStrike">
               <a:latin typeface="Arial"/>
             </a:endParaRPr>
           </a:p>
           <a:p>
             <a:pPr lvl="3" marL="1728000" indent="-216000">
+              <a:spcBef>
+                <a:spcPts val="567"/>
+              </a:spcBef>
               <a:buClr>
                 <a:srgbClr val="000000"/>
               </a:buClr>
@@ -1676,33 +1495,20 @@
               <a:buChar char=""/>
             </a:pPr>
             <a:r>
-              <a:rPr b="0" lang="fr-FR" sz="2000" spc="-1" strike="noStrike">
-                <a:solidFill>
-                  <a:srgbClr val="000000"/>
-                </a:solidFill>
-                <a:uFill>
-                  <a:solidFill>
-                    <a:srgbClr val="ffffff"/>
-                  </a:solidFill>
-                </a:uFill>
+              <a:rPr b="0" lang="en-US" sz="1800" spc="-1" strike="noStrike">
                 <a:latin typeface="Arial"/>
               </a:rPr>
               <a:t>Fourth Outline Level</a:t>
             </a:r>
-            <a:endParaRPr b="0" lang="fr-FR" sz="2000" spc="-1" strike="noStrike">
-              <a:solidFill>
-                <a:srgbClr val="000000"/>
-              </a:solidFill>
-              <a:uFill>
-                <a:solidFill>
-                  <a:srgbClr val="ffffff"/>
-                </a:solidFill>
-              </a:uFill>
+            <a:endParaRPr b="0" lang="en-US" sz="1800" spc="-1" strike="noStrike">
               <a:latin typeface="Arial"/>
             </a:endParaRPr>
           </a:p>
           <a:p>
             <a:pPr lvl="4" marL="2160000" indent="-216000">
+              <a:spcBef>
+                <a:spcPts val="283"/>
+              </a:spcBef>
               <a:buClr>
                 <a:srgbClr val="000000"/>
               </a:buClr>
@@ -1711,33 +1517,20 @@
               <a:buChar char=""/>
             </a:pPr>
             <a:r>
-              <a:rPr b="0" lang="fr-FR" sz="2000" spc="-1" strike="noStrike">
-                <a:solidFill>
-                  <a:srgbClr val="000000"/>
-                </a:solidFill>
-                <a:uFill>
-                  <a:solidFill>
-                    <a:srgbClr val="ffffff"/>
-                  </a:solidFill>
-                </a:uFill>
+              <a:rPr b="0" lang="en-US" sz="1800" spc="-1" strike="noStrike">
                 <a:latin typeface="Arial"/>
               </a:rPr>
               <a:t>Fifth Outline Level</a:t>
             </a:r>
-            <a:endParaRPr b="0" lang="fr-FR" sz="2000" spc="-1" strike="noStrike">
-              <a:solidFill>
-                <a:srgbClr val="000000"/>
-              </a:solidFill>
-              <a:uFill>
-                <a:solidFill>
-                  <a:srgbClr val="ffffff"/>
-                </a:solidFill>
-              </a:uFill>
+            <a:endParaRPr b="0" lang="en-US" sz="1800" spc="-1" strike="noStrike">
               <a:latin typeface="Arial"/>
             </a:endParaRPr>
           </a:p>
           <a:p>
             <a:pPr lvl="5" marL="2592000" indent="-216000">
+              <a:spcBef>
+                <a:spcPts val="283"/>
+              </a:spcBef>
               <a:buClr>
                 <a:srgbClr val="000000"/>
               </a:buClr>
@@ -1746,33 +1539,20 @@
               <a:buChar char=""/>
             </a:pPr>
             <a:r>
-              <a:rPr b="0" lang="fr-FR" sz="2000" spc="-1" strike="noStrike">
-                <a:solidFill>
-                  <a:srgbClr val="000000"/>
-                </a:solidFill>
-                <a:uFill>
-                  <a:solidFill>
-                    <a:srgbClr val="ffffff"/>
-                  </a:solidFill>
-                </a:uFill>
+              <a:rPr b="0" lang="en-US" sz="1800" spc="-1" strike="noStrike">
                 <a:latin typeface="Arial"/>
               </a:rPr>
               <a:t>Sixth Outline Level</a:t>
             </a:r>
-            <a:endParaRPr b="0" lang="fr-FR" sz="2000" spc="-1" strike="noStrike">
-              <a:solidFill>
-                <a:srgbClr val="000000"/>
-              </a:solidFill>
-              <a:uFill>
-                <a:solidFill>
-                  <a:srgbClr val="ffffff"/>
-                </a:solidFill>
-              </a:uFill>
+            <a:endParaRPr b="0" lang="en-US" sz="1800" spc="-1" strike="noStrike">
               <a:latin typeface="Arial"/>
             </a:endParaRPr>
           </a:p>
           <a:p>
             <a:pPr lvl="6" marL="3024000" indent="-216000">
+              <a:spcBef>
+                <a:spcPts val="283"/>
+              </a:spcBef>
               <a:buClr>
                 <a:srgbClr val="000000"/>
               </a:buClr>
@@ -1781,28 +1561,12 @@
               <a:buChar char=""/>
             </a:pPr>
             <a:r>
-              <a:rPr b="0" lang="fr-FR" sz="2000" spc="-1" strike="noStrike">
-                <a:solidFill>
-                  <a:srgbClr val="000000"/>
-                </a:solidFill>
-                <a:uFill>
-                  <a:solidFill>
-                    <a:srgbClr val="ffffff"/>
-                  </a:solidFill>
-                </a:uFill>
+              <a:rPr b="0" lang="en-US" sz="1800" spc="-1" strike="noStrike">
                 <a:latin typeface="Arial"/>
               </a:rPr>
               <a:t>Seventh Outline Level</a:t>
             </a:r>
-            <a:endParaRPr b="0" lang="fr-FR" sz="2000" spc="-1" strike="noStrike">
-              <a:solidFill>
-                <a:srgbClr val="000000"/>
-              </a:solidFill>
-              <a:uFill>
-                <a:solidFill>
-                  <a:srgbClr val="ffffff"/>
-                </a:solidFill>
-              </a:uFill>
+            <a:endParaRPr b="0" lang="en-US" sz="1800" spc="-1" strike="noStrike">
               <a:latin typeface="Arial"/>
             </a:endParaRPr>
           </a:p>
@@ -1847,14 +1611,14 @@
       </p:grpSpPr>
       <p:sp>
         <p:nvSpPr>
-          <p:cNvPr id="36" name="CustomShape 1"/>
+          <p:cNvPr id="38" name="CustomShape 1"/>
           <p:cNvSpPr/>
           <p:nvPr/>
         </p:nvSpPr>
         <p:spPr>
           <a:xfrm>
             <a:off x="504000" y="301320"/>
-            <a:ext cx="9071280" cy="1261800"/>
+            <a:ext cx="9070920" cy="1261440"/>
           </a:xfrm>
           <a:prstGeom prst="rect">
             <a:avLst/>
@@ -1975,31 +1739,31 @@
         <a:sysClr val="window" lastClr="FFFFFF"/>
       </a:lt1>
       <a:dk2>
-        <a:srgbClr val="1F497D"/>
+        <a:srgbClr val="1f497d"/>
       </a:dk2>
       <a:lt2>
-        <a:srgbClr val="EEECE1"/>
+        <a:srgbClr val="eeece1"/>
       </a:lt2>
       <a:accent1>
-        <a:srgbClr val="4F81BD"/>
+        <a:srgbClr val="4f81bd"/>
       </a:accent1>
       <a:accent2>
-        <a:srgbClr val="C0504D"/>
+        <a:srgbClr val="c0504d"/>
       </a:accent2>
       <a:accent3>
-        <a:srgbClr val="9BBB59"/>
+        <a:srgbClr val="9bbb59"/>
       </a:accent3>
       <a:accent4>
-        <a:srgbClr val="8064A2"/>
+        <a:srgbClr val="8064a2"/>
       </a:accent4>
       <a:accent5>
-        <a:srgbClr val="4BACC6"/>
+        <a:srgbClr val="4bacc6"/>
       </a:accent5>
       <a:accent6>
-        <a:srgbClr val="F79646"/>
+        <a:srgbClr val="f79646"/>
       </a:accent6>
       <a:hlink>
-        <a:srgbClr val="0000FF"/>
+        <a:srgbClr val="0000ff"/>
       </a:hlink>
       <a:folHlink>
         <a:srgbClr val="800080"/>

</xml_diff>